<commit_message>
[DOCS] architecture hive DB 그림 오류 수정
</commit_message>
<xml_diff>
--- a/docs/architecture.pptx
+++ b/docs/architecture.pptx
@@ -14,11 +14,11 @@
   <p:notesSz cx="6858000" cy="9144000"/>
   <p:embeddedFontLst>
     <p:embeddedFont>
-      <p:font typeface="G마켓 산스 Light" panose="02000000000000000000" pitchFamily="50" charset="-127"/>
+      <p:font typeface="G마켓 산스 Bold" panose="02000000000000000000" pitchFamily="50" charset="-127"/>
       <p:regular r:id="rId4"/>
     </p:embeddedFont>
     <p:embeddedFont>
-      <p:font typeface="G마켓 산스 Bold" panose="02000000000000000000" pitchFamily="50" charset="-127"/>
+      <p:font typeface="G마켓 산스 Light" panose="02000000000000000000" pitchFamily="50" charset="-127"/>
       <p:regular r:id="rId5"/>
     </p:embeddedFont>
     <p:embeddedFont>
@@ -227,7 +227,7 @@
           <a:p>
             <a:fld id="{15140E47-85F6-44CF-AC3F-9201FB2C393D}" type="datetimeFigureOut">
               <a:rPr lang="ko-KR" altLang="en-US" smtClean="0"/>
-              <a:t>2023-06-13</a:t>
+              <a:t>2023-06-15</a:t>
             </a:fld>
             <a:endParaRPr lang="ko-KR" altLang="en-US"/>
           </a:p>
@@ -618,7 +618,7 @@
           <a:p>
             <a:fld id="{1936D5F6-BC02-41A5-B223-3CD09E1136B4}" type="datetimeFigureOut">
               <a:rPr lang="ko-KR" altLang="en-US" smtClean="0"/>
-              <a:t>2023-06-13</a:t>
+              <a:t>2023-06-15</a:t>
             </a:fld>
             <a:endParaRPr lang="ko-KR" altLang="en-US"/>
           </a:p>
@@ -749,7 +749,7 @@
           <a:p>
             <a:fld id="{1936D5F6-BC02-41A5-B223-3CD09E1136B4}" type="datetimeFigureOut">
               <a:rPr lang="ko-KR" altLang="en-US" smtClean="0"/>
-              <a:t>2023-06-13</a:t>
+              <a:t>2023-06-15</a:t>
             </a:fld>
             <a:endParaRPr lang="ko-KR" altLang="en-US"/>
           </a:p>
@@ -878,7 +878,7 @@
           <a:p>
             <a:fld id="{1936D5F6-BC02-41A5-B223-3CD09E1136B4}" type="datetimeFigureOut">
               <a:rPr lang="ko-KR" altLang="en-US" smtClean="0"/>
-              <a:t>2023-06-13</a:t>
+              <a:t>2023-06-15</a:t>
             </a:fld>
             <a:endParaRPr lang="ko-KR" altLang="en-US"/>
           </a:p>
@@ -1007,7 +1007,7 @@
           <a:p>
             <a:fld id="{1936D5F6-BC02-41A5-B223-3CD09E1136B4}" type="datetimeFigureOut">
               <a:rPr lang="ko-KR" altLang="en-US" smtClean="0"/>
-              <a:t>2023-06-13</a:t>
+              <a:t>2023-06-15</a:t>
             </a:fld>
             <a:endParaRPr lang="ko-KR" altLang="en-US"/>
           </a:p>
@@ -1136,7 +1136,7 @@
           <a:p>
             <a:fld id="{1936D5F6-BC02-41A5-B223-3CD09E1136B4}" type="datetimeFigureOut">
               <a:rPr lang="ko-KR" altLang="en-US" smtClean="0"/>
-              <a:t>2023-06-13</a:t>
+              <a:t>2023-06-15</a:t>
             </a:fld>
             <a:endParaRPr lang="ko-KR" altLang="en-US"/>
           </a:p>
@@ -1265,7 +1265,7 @@
           <a:p>
             <a:fld id="{1936D5F6-BC02-41A5-B223-3CD09E1136B4}" type="datetimeFigureOut">
               <a:rPr lang="ko-KR" altLang="en-US" smtClean="0"/>
-              <a:t>2023-06-13</a:t>
+              <a:t>2023-06-15</a:t>
             </a:fld>
             <a:endParaRPr lang="ko-KR" altLang="en-US"/>
           </a:p>
@@ -1394,7 +1394,7 @@
           <a:p>
             <a:fld id="{1936D5F6-BC02-41A5-B223-3CD09E1136B4}" type="datetimeFigureOut">
               <a:rPr lang="ko-KR" altLang="en-US" smtClean="0"/>
-              <a:t>2023-06-13</a:t>
+              <a:t>2023-06-15</a:t>
             </a:fld>
             <a:endParaRPr lang="ko-KR" altLang="en-US"/>
           </a:p>
@@ -1523,7 +1523,7 @@
           <a:p>
             <a:fld id="{1936D5F6-BC02-41A5-B223-3CD09E1136B4}" type="datetimeFigureOut">
               <a:rPr lang="ko-KR" altLang="en-US" smtClean="0"/>
-              <a:t>2023-06-13</a:t>
+              <a:t>2023-06-15</a:t>
             </a:fld>
             <a:endParaRPr lang="ko-KR" altLang="en-US"/>
           </a:p>
@@ -1652,7 +1652,7 @@
           <a:p>
             <a:fld id="{1936D5F6-BC02-41A5-B223-3CD09E1136B4}" type="datetimeFigureOut">
               <a:rPr lang="ko-KR" altLang="en-US" smtClean="0"/>
-              <a:t>2023-06-13</a:t>
+              <a:t>2023-06-15</a:t>
             </a:fld>
             <a:endParaRPr lang="ko-KR" altLang="en-US"/>
           </a:p>
@@ -1796,7 +1796,7 @@
           <a:p>
             <a:fld id="{1936D5F6-BC02-41A5-B223-3CD09E1136B4}" type="datetimeFigureOut">
               <a:rPr lang="ko-KR" altLang="en-US" smtClean="0"/>
-              <a:t>2023-06-13</a:t>
+              <a:t>2023-06-15</a:t>
             </a:fld>
             <a:endParaRPr lang="ko-KR" altLang="en-US"/>
           </a:p>
@@ -2221,10 +2221,10 @@
       </p:grpSpPr>
       <p:pic>
         <p:nvPicPr>
-          <p:cNvPr id="5" name="Picture 6" descr="Node.js - express (10) express-session 사용하기 — BlockChain_Developer">
-            <a:extLst>
-              <a:ext uri="{FF2B5EF4-FFF2-40B4-BE49-F238E27FC236}">
-                <a16:creationId xmlns:a16="http://schemas.microsoft.com/office/drawing/2014/main" id="{EC2D65EB-B716-DECB-45ED-48E43ADC7C5E}"/>
+          <p:cNvPr id="1026" name="Picture 2" descr="개발][Flutter] TypeAdapter로 Hive DataBase 사용하기 — Steemit">
+            <a:extLst>
+              <a:ext uri="{FF2B5EF4-FFF2-40B4-BE49-F238E27FC236}">
+                <a16:creationId xmlns:a16="http://schemas.microsoft.com/office/drawing/2014/main" id="{235F75AE-763F-9FC5-E9DB-A3AE766BF628}"/>
               </a:ext>
             </a:extLst>
           </p:cNvPr>
@@ -2235,6 +2235,53 @@
         </p:nvPicPr>
         <p:blipFill>
           <a:blip r:embed="rId3">
+            <a:extLst>
+              <a:ext uri="{28A0092B-C50C-407E-A947-70E740481C1C}">
+                <a14:useLocalDpi xmlns:a14="http://schemas.microsoft.com/office/drawing/2010/main" val="0"/>
+              </a:ext>
+            </a:extLst>
+          </a:blip>
+          <a:srcRect/>
+          <a:stretch>
+            <a:fillRect/>
+          </a:stretch>
+        </p:blipFill>
+        <p:spPr bwMode="auto">
+          <a:xfrm>
+            <a:off x="2134267" y="3905211"/>
+            <a:ext cx="2312083" cy="1006436"/>
+          </a:xfrm>
+          <a:prstGeom prst="rect">
+            <a:avLst/>
+          </a:prstGeom>
+          <a:noFill/>
+          <a:extLst>
+            <a:ext uri="{909E8E84-426E-40DD-AFC4-6F175D3DCCD1}">
+              <a14:hiddenFill xmlns:a14="http://schemas.microsoft.com/office/drawing/2010/main">
+                <a:solidFill>
+                  <a:srgbClr val="FFFFFF"/>
+                </a:solidFill>
+              </a14:hiddenFill>
+            </a:ext>
+          </a:extLst>
+        </p:spPr>
+      </p:pic>
+      <p:pic>
+        <p:nvPicPr>
+          <p:cNvPr id="5" name="Picture 6" descr="Node.js - express (10) express-session 사용하기 — BlockChain_Developer">
+            <a:extLst>
+              <a:ext uri="{FF2B5EF4-FFF2-40B4-BE49-F238E27FC236}">
+                <a16:creationId xmlns:a16="http://schemas.microsoft.com/office/drawing/2014/main" id="{EC2D65EB-B716-DECB-45ED-48E43ADC7C5E}"/>
+              </a:ext>
+            </a:extLst>
+          </p:cNvPr>
+          <p:cNvPicPr>
+            <a:picLocks noChangeAspect="1" noChangeArrowheads="1"/>
+          </p:cNvPicPr>
+          <p:nvPr/>
+        </p:nvPicPr>
+        <p:blipFill>
+          <a:blip r:embed="rId4">
             <a:extLst>
               <a:ext uri="{28A0092B-C50C-407E-A947-70E740481C1C}">
                 <a14:useLocalDpi xmlns:a14="http://schemas.microsoft.com/office/drawing/2010/main" val="0"/>
@@ -2487,7 +2534,7 @@
           <p:nvPr/>
         </p:nvPicPr>
         <p:blipFill>
-          <a:blip r:embed="rId4">
+          <a:blip r:embed="rId5">
             <a:extLst>
               <a:ext uri="{28A0092B-C50C-407E-A947-70E740481C1C}">
                 <a14:useLocalDpi xmlns:a14="http://schemas.microsoft.com/office/drawing/2010/main" val="0"/>
@@ -2717,53 +2764,6 @@
           </a:p>
         </p:txBody>
       </p:sp>
-      <p:pic>
-        <p:nvPicPr>
-          <p:cNvPr id="1028" name="Picture 4" descr="upload.wikimedia.org/wikipedia/commons/thumb/b/...">
-            <a:extLst>
-              <a:ext uri="{FF2B5EF4-FFF2-40B4-BE49-F238E27FC236}">
-                <a16:creationId xmlns:a16="http://schemas.microsoft.com/office/drawing/2014/main" id="{4A0A22E0-A71E-0474-F0E6-DCFE8B0C3B4A}"/>
-              </a:ext>
-            </a:extLst>
-          </p:cNvPr>
-          <p:cNvPicPr>
-            <a:picLocks noChangeAspect="1" noChangeArrowheads="1"/>
-          </p:cNvPicPr>
-          <p:nvPr/>
-        </p:nvPicPr>
-        <p:blipFill>
-          <a:blip r:embed="rId5">
-            <a:extLst>
-              <a:ext uri="{28A0092B-C50C-407E-A947-70E740481C1C}">
-                <a14:useLocalDpi xmlns:a14="http://schemas.microsoft.com/office/drawing/2010/main" val="0"/>
-              </a:ext>
-            </a:extLst>
-          </a:blip>
-          <a:srcRect/>
-          <a:stretch>
-            <a:fillRect/>
-          </a:stretch>
-        </p:blipFill>
-        <p:spPr bwMode="auto">
-          <a:xfrm>
-            <a:off x="2584120" y="3710828"/>
-            <a:ext cx="1393181" cy="1253863"/>
-          </a:xfrm>
-          <a:prstGeom prst="rect">
-            <a:avLst/>
-          </a:prstGeom>
-          <a:noFill/>
-          <a:extLst>
-            <a:ext uri="{909E8E84-426E-40DD-AFC4-6F175D3DCCD1}">
-              <a14:hiddenFill xmlns:a14="http://schemas.microsoft.com/office/drawing/2010/main">
-                <a:solidFill>
-                  <a:srgbClr val="FFFFFF"/>
-                </a:solidFill>
-              </a14:hiddenFill>
-            </a:ext>
-          </a:extLst>
-        </p:spPr>
-      </p:pic>
       <p:pic>
         <p:nvPicPr>
           <p:cNvPr id="1032" name="Picture 8" descr="호스팅된 MySQL - Amazon RDS for MySQL - AWS">
@@ -2886,7 +2886,7 @@
         </p:blipFill>
         <p:spPr bwMode="auto">
           <a:xfrm>
-            <a:off x="4421070" y="3941620"/>
+            <a:off x="4456239" y="3894728"/>
             <a:ext cx="1883586" cy="893134"/>
           </a:xfrm>
           <a:prstGeom prst="rect">

</xml_diff>